<commit_message>
Trevor adding his stuff again due to earlier problem
</commit_message>
<xml_diff>
--- a/Greenside_SQLinjections.pptx
+++ b/Greenside_SQLinjections.pptx
@@ -7,7 +7,8 @@
   <p:sldIdLst>
     <p:sldId id="256" r:id="rId2"/>
     <p:sldId id="258" r:id="rId3"/>
-    <p:sldId id="257" r:id="rId4"/>
+    <p:sldId id="259" r:id="rId4"/>
+    <p:sldId id="257" r:id="rId5"/>
   </p:sldIdLst>
   <p:sldSz cx="12192000" cy="6858000"/>
   <p:notesSz cx="6858000" cy="9144000"/>
@@ -343,7 +344,7 @@
           <a:p>
             <a:fld id="{E460E42F-7096-A54B-88BF-7A4B8070F7FB}" type="datetimeFigureOut">
               <a:rPr lang="en-US" smtClean="0"/>
-              <a:t>12/1/17</a:t>
+              <a:t>12/3/17</a:t>
             </a:fld>
             <a:endParaRPr lang="en-US"/>
           </a:p>
@@ -682,7 +683,7 @@
           <a:p>
             <a:fld id="{E460E42F-7096-A54B-88BF-7A4B8070F7FB}" type="datetimeFigureOut">
               <a:rPr lang="en-US" smtClean="0"/>
-              <a:t>12/1/17</a:t>
+              <a:t>12/3/17</a:t>
             </a:fld>
             <a:endParaRPr lang="en-US"/>
           </a:p>
@@ -960,7 +961,7 @@
           <a:p>
             <a:fld id="{E460E42F-7096-A54B-88BF-7A4B8070F7FB}" type="datetimeFigureOut">
               <a:rPr lang="en-US" smtClean="0"/>
-              <a:t>12/1/17</a:t>
+              <a:t>12/3/17</a:t>
             </a:fld>
             <a:endParaRPr lang="en-US"/>
           </a:p>
@@ -1528,7 +1529,7 @@
           <a:p>
             <a:fld id="{E460E42F-7096-A54B-88BF-7A4B8070F7FB}" type="datetimeFigureOut">
               <a:rPr lang="en-US" smtClean="0"/>
-              <a:t>12/1/17</a:t>
+              <a:t>12/3/17</a:t>
             </a:fld>
             <a:endParaRPr lang="en-US"/>
           </a:p>
@@ -1806,7 +1807,7 @@
           <a:p>
             <a:fld id="{E460E42F-7096-A54B-88BF-7A4B8070F7FB}" type="datetimeFigureOut">
               <a:rPr lang="en-US" smtClean="0"/>
-              <a:t>12/1/17</a:t>
+              <a:t>12/3/17</a:t>
             </a:fld>
             <a:endParaRPr lang="en-US"/>
           </a:p>
@@ -2368,7 +2369,7 @@
           <a:p>
             <a:fld id="{E460E42F-7096-A54B-88BF-7A4B8070F7FB}" type="datetimeFigureOut">
               <a:rPr lang="en-US" smtClean="0"/>
-              <a:t>12/1/17</a:t>
+              <a:t>12/3/17</a:t>
             </a:fld>
             <a:endParaRPr lang="en-US"/>
           </a:p>
@@ -2695,7 +2696,7 @@
           <a:p>
             <a:fld id="{E460E42F-7096-A54B-88BF-7A4B8070F7FB}" type="datetimeFigureOut">
               <a:rPr lang="en-US" smtClean="0"/>
-              <a:t>12/1/17</a:t>
+              <a:t>12/3/17</a:t>
             </a:fld>
             <a:endParaRPr lang="en-US"/>
           </a:p>
@@ -2900,7 +2901,7 @@
           <a:p>
             <a:fld id="{E460E42F-7096-A54B-88BF-7A4B8070F7FB}" type="datetimeFigureOut">
               <a:rPr lang="en-US" smtClean="0"/>
-              <a:t>12/1/17</a:t>
+              <a:t>12/3/17</a:t>
             </a:fld>
             <a:endParaRPr lang="en-US"/>
           </a:p>
@@ -3110,7 +3111,7 @@
           <a:p>
             <a:fld id="{E460E42F-7096-A54B-88BF-7A4B8070F7FB}" type="datetimeFigureOut">
               <a:rPr lang="en-US" smtClean="0"/>
-              <a:t>12/1/17</a:t>
+              <a:t>12/3/17</a:t>
             </a:fld>
             <a:endParaRPr lang="en-US"/>
           </a:p>
@@ -3315,7 +3316,7 @@
           <a:p>
             <a:fld id="{E460E42F-7096-A54B-88BF-7A4B8070F7FB}" type="datetimeFigureOut">
               <a:rPr lang="en-US" smtClean="0"/>
-              <a:t>12/1/17</a:t>
+              <a:t>12/3/17</a:t>
             </a:fld>
             <a:endParaRPr lang="en-US"/>
           </a:p>
@@ -3591,7 +3592,7 @@
           <a:p>
             <a:fld id="{E460E42F-7096-A54B-88BF-7A4B8070F7FB}" type="datetimeFigureOut">
               <a:rPr lang="en-US" smtClean="0"/>
-              <a:t>12/1/17</a:t>
+              <a:t>12/3/17</a:t>
             </a:fld>
             <a:endParaRPr lang="en-US"/>
           </a:p>
@@ -3862,7 +3863,7 @@
           <a:p>
             <a:fld id="{E460E42F-7096-A54B-88BF-7A4B8070F7FB}" type="datetimeFigureOut">
               <a:rPr lang="en-US" smtClean="0"/>
-              <a:t>12/1/17</a:t>
+              <a:t>12/3/17</a:t>
             </a:fld>
             <a:endParaRPr lang="en-US"/>
           </a:p>
@@ -4236,7 +4237,7 @@
           <a:p>
             <a:fld id="{E460E42F-7096-A54B-88BF-7A4B8070F7FB}" type="datetimeFigureOut">
               <a:rPr lang="en-US" smtClean="0"/>
-              <a:t>12/1/17</a:t>
+              <a:t>12/3/17</a:t>
             </a:fld>
             <a:endParaRPr lang="en-US"/>
           </a:p>
@@ -4384,7 +4385,7 @@
           <a:p>
             <a:fld id="{E460E42F-7096-A54B-88BF-7A4B8070F7FB}" type="datetimeFigureOut">
               <a:rPr lang="en-US" smtClean="0"/>
-              <a:t>12/1/17</a:t>
+              <a:t>12/3/17</a:t>
             </a:fld>
             <a:endParaRPr lang="en-US"/>
           </a:p>
@@ -4509,7 +4510,7 @@
           <a:p>
             <a:fld id="{E460E42F-7096-A54B-88BF-7A4B8070F7FB}" type="datetimeFigureOut">
               <a:rPr lang="en-US" smtClean="0"/>
-              <a:t>12/1/17</a:t>
+              <a:t>12/3/17</a:t>
             </a:fld>
             <a:endParaRPr lang="en-US"/>
           </a:p>
@@ -4799,7 +4800,7 @@
           <a:p>
             <a:fld id="{E460E42F-7096-A54B-88BF-7A4B8070F7FB}" type="datetimeFigureOut">
               <a:rPr lang="en-US" smtClean="0"/>
-              <a:t>12/1/17</a:t>
+              <a:t>12/3/17</a:t>
             </a:fld>
             <a:endParaRPr lang="en-US"/>
           </a:p>
@@ -5128,7 +5129,7 @@
           <a:p>
             <a:fld id="{E460E42F-7096-A54B-88BF-7A4B8070F7FB}" type="datetimeFigureOut">
               <a:rPr lang="en-US" smtClean="0"/>
-              <a:t>12/1/17</a:t>
+              <a:t>12/3/17</a:t>
             </a:fld>
             <a:endParaRPr lang="en-US"/>
           </a:p>
@@ -5342,7 +5343,7 @@
           <a:p>
             <a:fld id="{E460E42F-7096-A54B-88BF-7A4B8070F7FB}" type="datetimeFigureOut">
               <a:rPr lang="en-US" smtClean="0"/>
-              <a:t>12/1/17</a:t>
+              <a:t>12/3/17</a:t>
             </a:fld>
             <a:endParaRPr lang="en-US"/>
           </a:p>
@@ -5974,7 +5975,22 @@
           <a:bodyPr/>
           <a:lstStyle/>
           <a:p>
-            <a:endParaRPr lang="en-US"/>
+            <a:r>
+              <a:rPr lang="en-US" dirty="0" smtClean="0"/>
+              <a:t>First publicly discussed in 1998 by </a:t>
+            </a:r>
+            <a:r>
+              <a:rPr lang="en-US" dirty="0"/>
+              <a:t>Jeff </a:t>
+            </a:r>
+            <a:r>
+              <a:rPr lang="en-US" dirty="0" err="1" smtClean="0"/>
+              <a:t>Foristal</a:t>
+            </a:r>
+            <a:endParaRPr lang="en-US" dirty="0" smtClean="0"/>
+          </a:p>
+          <a:p>
+            <a:endParaRPr lang="en-US" dirty="0"/>
           </a:p>
         </p:txBody>
       </p:sp>
@@ -5992,6 +6008,83 @@
 </file>
 
 <file path=ppt/slides/slide3.xml><?xml version="1.0" encoding="utf-8"?>
+<p:sld xmlns:a="http://schemas.openxmlformats.org/drawingml/2006/main" xmlns:r="http://schemas.openxmlformats.org/officeDocument/2006/relationships" xmlns:p="http://schemas.openxmlformats.org/presentationml/2006/main">
+  <p:cSld>
+    <p:spTree>
+      <p:nvGrpSpPr>
+        <p:cNvPr id="1" name=""/>
+        <p:cNvGrpSpPr/>
+        <p:nvPr/>
+      </p:nvGrpSpPr>
+      <p:grpSpPr>
+        <a:xfrm>
+          <a:off x="0" y="0"/>
+          <a:ext cx="0" cy="0"/>
+          <a:chOff x="0" y="0"/>
+          <a:chExt cx="0" cy="0"/>
+        </a:xfrm>
+      </p:grpSpPr>
+      <p:sp>
+        <p:nvSpPr>
+          <p:cNvPr id="2" name="Title 1"/>
+          <p:cNvSpPr>
+            <a:spLocks noGrp="1"/>
+          </p:cNvSpPr>
+          <p:nvPr>
+            <p:ph type="title"/>
+          </p:nvPr>
+        </p:nvSpPr>
+        <p:spPr/>
+        <p:txBody>
+          <a:bodyPr/>
+          <a:lstStyle/>
+          <a:p>
+            <a:r>
+              <a:rPr lang="en-US" dirty="0" smtClean="0"/>
+              <a:t>Recent uses</a:t>
+            </a:r>
+            <a:endParaRPr lang="en-US" dirty="0"/>
+          </a:p>
+        </p:txBody>
+      </p:sp>
+      <p:sp>
+        <p:nvSpPr>
+          <p:cNvPr id="3" name="Content Placeholder 2"/>
+          <p:cNvSpPr>
+            <a:spLocks noGrp="1"/>
+          </p:cNvSpPr>
+          <p:nvPr>
+            <p:ph idx="1"/>
+          </p:nvPr>
+        </p:nvSpPr>
+        <p:spPr>
+          <a:xfrm>
+            <a:off x="685802" y="2142067"/>
+            <a:ext cx="7196558" cy="3649133"/>
+          </a:xfrm>
+        </p:spPr>
+        <p:txBody>
+          <a:bodyPr/>
+          <a:lstStyle/>
+          <a:p>
+            <a:endParaRPr lang="en-US"/>
+          </a:p>
+        </p:txBody>
+      </p:sp>
+    </p:spTree>
+    <p:extLst>
+      <p:ext uri="{BB962C8B-B14F-4D97-AF65-F5344CB8AC3E}">
+        <p14:creationId xmlns:p14="http://schemas.microsoft.com/office/powerpoint/2010/main" val="46973598"/>
+      </p:ext>
+    </p:extLst>
+  </p:cSld>
+  <p:clrMapOvr>
+    <a:masterClrMapping/>
+  </p:clrMapOvr>
+</p:sld>
+</file>
+
+<file path=ppt/slides/slide4.xml><?xml version="1.0" encoding="utf-8"?>
 <p:sld xmlns:a="http://schemas.openxmlformats.org/drawingml/2006/main" xmlns:r="http://schemas.openxmlformats.org/officeDocument/2006/relationships" xmlns:p="http://schemas.openxmlformats.org/presentationml/2006/main">
   <p:cSld>
     <p:spTree>

</xml_diff>